<commit_message>
ajout de la dernière version
</commit_message>
<xml_diff>
--- a/presentation1.pptx
+++ b/presentation1.pptx
@@ -224,7 +224,7 @@
           <a:p>
             <a:fld id="{BD909028-EDE8-7244-8C0C-B621A4B8742D}" type="datetimeFigureOut">
               <a:rPr lang="en-US" smtClean="0"/>
-              <a:t>3/11/18</a:t>
+              <a:t>3/13/18</a:t>
             </a:fld>
             <a:endParaRPr lang="en-US"/>
           </a:p>
@@ -2662,7 +2662,7 @@
           <a:p>
             <a:fld id="{F1050F85-94B7-F249-B231-5B809826353C}" type="datetimeFigureOut">
               <a:rPr lang="en-US" smtClean="0"/>
-              <a:t>3/11/18</a:t>
+              <a:t>3/13/18</a:t>
             </a:fld>
             <a:endParaRPr lang="en-US"/>
           </a:p>
@@ -2927,7 +2927,7 @@
           <a:p>
             <a:fld id="{F1050F85-94B7-F249-B231-5B809826353C}" type="datetimeFigureOut">
               <a:rPr lang="en-US" smtClean="0"/>
-              <a:t>3/11/18</a:t>
+              <a:t>3/13/18</a:t>
             </a:fld>
             <a:endParaRPr lang="en-US"/>
           </a:p>
@@ -3102,7 +3102,7 @@
           <a:p>
             <a:fld id="{F1050F85-94B7-F249-B231-5B809826353C}" type="datetimeFigureOut">
               <a:rPr lang="en-US" smtClean="0"/>
-              <a:t>3/11/18</a:t>
+              <a:t>3/13/18</a:t>
             </a:fld>
             <a:endParaRPr lang="en-US"/>
           </a:p>
@@ -3267,7 +3267,7 @@
           <a:p>
             <a:fld id="{F1050F85-94B7-F249-B231-5B809826353C}" type="datetimeFigureOut">
               <a:rPr lang="en-US" smtClean="0"/>
-              <a:t>3/11/18</a:t>
+              <a:t>3/13/18</a:t>
             </a:fld>
             <a:endParaRPr lang="en-US"/>
           </a:p>
@@ -3516,7 +3516,7 @@
           <a:p>
             <a:fld id="{F1050F85-94B7-F249-B231-5B809826353C}" type="datetimeFigureOut">
               <a:rPr lang="en-US" smtClean="0"/>
-              <a:t>3/11/18</a:t>
+              <a:t>3/13/18</a:t>
             </a:fld>
             <a:endParaRPr lang="en-US"/>
           </a:p>
@@ -3799,7 +3799,7 @@
           <a:p>
             <a:fld id="{F1050F85-94B7-F249-B231-5B809826353C}" type="datetimeFigureOut">
               <a:rPr lang="en-US" smtClean="0"/>
-              <a:t>3/11/18</a:t>
+              <a:t>3/13/18</a:t>
             </a:fld>
             <a:endParaRPr lang="en-US"/>
           </a:p>
@@ -4238,7 +4238,7 @@
           <a:p>
             <a:fld id="{F1050F85-94B7-F249-B231-5B809826353C}" type="datetimeFigureOut">
               <a:rPr lang="en-US" smtClean="0"/>
-              <a:t>3/11/18</a:t>
+              <a:t>3/13/18</a:t>
             </a:fld>
             <a:endParaRPr lang="en-US"/>
           </a:p>
@@ -4351,7 +4351,7 @@
           <a:p>
             <a:fld id="{F1050F85-94B7-F249-B231-5B809826353C}" type="datetimeFigureOut">
               <a:rPr lang="en-US" smtClean="0"/>
-              <a:t>3/11/18</a:t>
+              <a:t>3/13/18</a:t>
             </a:fld>
             <a:endParaRPr lang="en-US"/>
           </a:p>
@@ -4441,7 +4441,7 @@
           <a:p>
             <a:fld id="{F1050F85-94B7-F249-B231-5B809826353C}" type="datetimeFigureOut">
               <a:rPr lang="en-US" smtClean="0"/>
-              <a:t>3/11/18</a:t>
+              <a:t>3/13/18</a:t>
             </a:fld>
             <a:endParaRPr lang="en-US"/>
           </a:p>
@@ -4683,7 +4683,7 @@
           <a:p>
             <a:fld id="{F1050F85-94B7-F249-B231-5B809826353C}" type="datetimeFigureOut">
               <a:rPr lang="en-US" smtClean="0"/>
-              <a:t>3/11/18</a:t>
+              <a:t>3/13/18</a:t>
             </a:fld>
             <a:endParaRPr lang="en-US"/>
           </a:p>
@@ -4977,7 +4977,7 @@
           <a:p>
             <a:fld id="{F1050F85-94B7-F249-B231-5B809826353C}" type="datetimeFigureOut">
               <a:rPr lang="en-US" smtClean="0"/>
-              <a:t>3/11/18</a:t>
+              <a:t>3/13/18</a:t>
             </a:fld>
             <a:endParaRPr lang="en-US"/>
           </a:p>
@@ -5271,7 +5271,7 @@
           <a:p>
             <a:fld id="{F1050F85-94B7-F249-B231-5B809826353C}" type="datetimeFigureOut">
               <a:rPr lang="en-US" smtClean="0"/>
-              <a:t>3/11/18</a:t>
+              <a:t>3/13/18</a:t>
             </a:fld>
             <a:endParaRPr lang="en-US"/>
           </a:p>
@@ -6121,7 +6121,23 @@
                   <a:schemeClr val="accent2"/>
                 </a:solidFill>
               </a:rPr>
-              <a:t>Les types de lumières utilisé dans le jeu sont:</a:t>
+              <a:t>Les types de lumières </a:t>
+            </a:r>
+            <a:r>
+              <a:rPr lang="fr-CA" b="0" dirty="0" smtClean="0">
+                <a:solidFill>
+                  <a:schemeClr val="accent2"/>
+                </a:solidFill>
+              </a:rPr>
+              <a:t>utilisés dans </a:t>
+            </a:r>
+            <a:r>
+              <a:rPr lang="fr-CA" b="0" dirty="0" smtClean="0">
+                <a:solidFill>
+                  <a:schemeClr val="accent2"/>
+                </a:solidFill>
+              </a:rPr>
+              <a:t>le jeu sont:</a:t>
             </a:r>
           </a:p>
           <a:p>
@@ -6136,15 +6152,15 @@
                   <a:schemeClr val="accent2"/>
                 </a:solidFill>
               </a:rPr>
-              <a:t>Lumière émissive: J’ai appliquer une source de lumière sur les pilules pour les </a:t>
-            </a:r>
-            <a:r>
-              <a:rPr lang="fr-CA" b="0" dirty="0" err="1" smtClean="0">
+              <a:t>Lumière émissive: J’ai </a:t>
+            </a:r>
+            <a:r>
+              <a:rPr lang="fr-CA" b="0" dirty="0" smtClean="0">
                 <a:solidFill>
                   <a:schemeClr val="accent2"/>
                 </a:solidFill>
               </a:rPr>
-              <a:t>mettres</a:t>
+              <a:t>appliqué </a:t>
             </a:r>
             <a:r>
               <a:rPr lang="fr-CA" b="0" dirty="0" smtClean="0">
@@ -6152,8 +6168,21 @@
                   <a:schemeClr val="accent2"/>
                 </a:solidFill>
               </a:rPr>
-              <a:t> en évidence. </a:t>
-            </a:r>
+              <a:t>une source de lumière sur les pilules pour les </a:t>
+            </a:r>
+            <a:r>
+              <a:rPr lang="fr-CA" b="0" dirty="0" smtClean="0">
+                <a:solidFill>
+                  <a:schemeClr val="accent2"/>
+                </a:solidFill>
+              </a:rPr>
+              <a:t>rendre plus visibles. </a:t>
+            </a:r>
+            <a:endParaRPr lang="fr-CA" b="0" dirty="0" smtClean="0">
+              <a:solidFill>
+                <a:schemeClr val="accent2"/>
+              </a:solidFill>
+            </a:endParaRPr>
           </a:p>
           <a:p>
             <a:pPr>
@@ -6433,7 +6462,15 @@
                   <a:schemeClr val="tx2"/>
                 </a:solidFill>
               </a:rPr>
-              <a:t>Faire des obstacles plus diversifié</a:t>
+              <a:t>Faire des obstacles plus </a:t>
+            </a:r>
+            <a:r>
+              <a:rPr lang="is-IS" sz="1400" dirty="0" smtClean="0">
+                <a:solidFill>
+                  <a:schemeClr val="tx2"/>
+                </a:solidFill>
+              </a:rPr>
+              <a:t>diversifiés</a:t>
             </a:r>
             <a:endParaRPr lang="is-IS" sz="1400" dirty="0" smtClean="0">
               <a:solidFill>
@@ -6770,8 +6807,8 @@
         </p:nvSpPr>
         <p:spPr>
           <a:xfrm>
-            <a:off x="2882858" y="444500"/>
-            <a:ext cx="4025900" cy="369332"/>
+            <a:off x="2705946" y="361354"/>
+            <a:ext cx="4025900" cy="523220"/>
           </a:xfrm>
           <a:prstGeom prst="rect">
             <a:avLst/>
@@ -6784,19 +6821,12 @@
           </a:bodyPr>
           <a:lstStyle/>
           <a:p>
-            <a:r>
-              <a:rPr lang="en-US" dirty="0" err="1" smtClean="0"/>
-              <a:t>Objectifs</a:t>
-            </a:r>
-            <a:r>
-              <a:rPr lang="en-US" dirty="0" smtClean="0"/>
-              <a:t>  des prochain </a:t>
-            </a:r>
-            <a:r>
-              <a:rPr lang="en-US" dirty="0" err="1" smtClean="0"/>
-              <a:t>mois</a:t>
-            </a:r>
-            <a:endParaRPr lang="en-US" dirty="0"/>
+            <a:pPr algn="ctr"/>
+            <a:r>
+              <a:rPr lang="en-US" sz="2800" dirty="0" smtClean="0"/>
+              <a:t>OBJECTIFS</a:t>
+            </a:r>
+            <a:endParaRPr lang="en-US" sz="2800" dirty="0"/>
           </a:p>
         </p:txBody>
       </p:sp>
@@ -6863,7 +6893,7 @@
         </p:spPr>
         <p:txBody>
           <a:bodyPr>
-            <a:normAutofit/>
+            <a:noAutofit/>
           </a:bodyPr>
           <a:lstStyle/>
           <a:p>
@@ -6873,10 +6903,10 @@
               </a:lnSpc>
             </a:pPr>
             <a:r>
-              <a:rPr lang="fr-CA" b="0" dirty="0" smtClean="0"/>
-              <a:t>Difficulté et problème</a:t>
-            </a:r>
-            <a:endParaRPr lang="en-US" u="sng" dirty="0"/>
+              <a:rPr lang="fr-CA" sz="2800" b="0" dirty="0" smtClean="0"/>
+              <a:t>DIFFICULTÉS ET PROBLÈMES</a:t>
+            </a:r>
+            <a:endParaRPr lang="en-US" sz="2800" u="sng" dirty="0"/>
           </a:p>
         </p:txBody>
       </p:sp>
@@ -7343,7 +7373,23 @@
                   <a:schemeClr val="bg1"/>
                 </a:solidFill>
               </a:rPr>
-              <a:t> était en lecture seulement</a:t>
+              <a:t> </a:t>
+            </a:r>
+            <a:r>
+              <a:rPr lang="fr-CA" sz="1400" dirty="0" smtClean="0">
+                <a:solidFill>
+                  <a:schemeClr val="bg1"/>
+                </a:solidFill>
+              </a:rPr>
+              <a:t>étaient </a:t>
+            </a:r>
+            <a:r>
+              <a:rPr lang="fr-CA" sz="1400" dirty="0" smtClean="0">
+                <a:solidFill>
+                  <a:schemeClr val="bg1"/>
+                </a:solidFill>
+              </a:rPr>
+              <a:t>en lecture seulement</a:t>
             </a:r>
           </a:p>
           <a:p>
@@ -7360,7 +7406,23 @@
                   <a:schemeClr val="bg1"/>
                 </a:solidFill>
               </a:rPr>
-              <a:t>Les animations suivait les coordonnées de Blender et non </a:t>
+              <a:t>Les animations </a:t>
+            </a:r>
+            <a:r>
+              <a:rPr lang="fr-CA" sz="1400" dirty="0" smtClean="0">
+                <a:solidFill>
+                  <a:schemeClr val="bg1"/>
+                </a:solidFill>
+              </a:rPr>
+              <a:t>suivaient </a:t>
+            </a:r>
+            <a:r>
+              <a:rPr lang="fr-CA" sz="1400" dirty="0" smtClean="0">
+                <a:solidFill>
+                  <a:schemeClr val="bg1"/>
+                </a:solidFill>
+              </a:rPr>
+              <a:t>les coordonnées de Blender et non </a:t>
             </a:r>
             <a:r>
               <a:rPr lang="fr-CA" sz="1400" dirty="0" err="1" smtClean="0">
@@ -7810,7 +7872,15 @@
             </a:pPr>
             <a:r>
               <a:rPr lang="fr-CA" b="1" dirty="0" smtClean="0"/>
-              <a:t>Elle bouge avec la sourit et réoriente le déplacement selon l’angle choisi.</a:t>
+              <a:t>Elle bouge avec la </a:t>
+            </a:r>
+            <a:r>
+              <a:rPr lang="fr-CA" b="1" dirty="0" smtClean="0"/>
+              <a:t>souris </a:t>
+            </a:r>
+            <a:r>
+              <a:rPr lang="fr-CA" b="1" dirty="0" smtClean="0"/>
+              <a:t>et réoriente le déplacement selon l’angle choisi.</a:t>
             </a:r>
           </a:p>
           <a:p>
@@ -7830,9 +7900,24 @@
             </a:pPr>
             <a:r>
               <a:rPr lang="fr-CA" b="1" dirty="0" smtClean="0"/>
-              <a:t>Elle peut aller directement au dessus du personnage mais pas plus haut.</a:t>
-            </a:r>
-            <a:endParaRPr lang="fr-CA" b="1" dirty="0" smtClean="0"/>
+              <a:t>Elle peut aller directement </a:t>
+            </a:r>
+            <a:r>
+              <a:rPr lang="fr-CA" b="1" dirty="0" smtClean="0"/>
+              <a:t>au-dessus </a:t>
+            </a:r>
+            <a:r>
+              <a:rPr lang="fr-CA" b="1" dirty="0" smtClean="0"/>
+              <a:t>du </a:t>
+            </a:r>
+            <a:r>
+              <a:rPr lang="fr-CA" b="1" dirty="0" smtClean="0"/>
+              <a:t>personnage, mais </a:t>
+            </a:r>
+            <a:r>
+              <a:rPr lang="fr-CA" b="1" dirty="0" smtClean="0"/>
+              <a:t>pas plus haut.</a:t>
+            </a:r>
           </a:p>
           <a:p>
             <a:endParaRPr lang="fr-CA" b="1" dirty="0"/>
@@ -7856,7 +7941,7 @@
         </p:nvSpPr>
         <p:spPr>
           <a:xfrm>
-            <a:off x="2890896" y="546100"/>
+            <a:off x="2890896" y="431800"/>
             <a:ext cx="4102100" cy="461665"/>
           </a:xfrm>
           <a:prstGeom prst="rect">
@@ -7873,7 +7958,7 @@
             <a:pPr algn="ctr"/>
             <a:r>
               <a:rPr lang="en-US" sz="2400" b="1" smtClean="0"/>
-              <a:t>Caméra</a:t>
+              <a:t>CAMÉRA</a:t>
             </a:r>
             <a:endParaRPr lang="en-US" sz="2400" b="1" dirty="0"/>
           </a:p>
@@ -8632,7 +8717,7 @@
         <p:spPr>
           <a:xfrm>
             <a:off x="2133226" y="642400"/>
-            <a:ext cx="4940300" cy="369332"/>
+            <a:ext cx="4940300" cy="523220"/>
           </a:xfrm>
           <a:prstGeom prst="rect">
             <a:avLst/>
@@ -8647,14 +8732,14 @@
           <a:p>
             <a:pPr algn="ctr"/>
             <a:r>
-              <a:rPr lang="en-US" dirty="0" smtClean="0"/>
+              <a:rPr lang="en-US" sz="2800" dirty="0" smtClean="0"/>
               <a:t>Division des t</a:t>
             </a:r>
             <a:r>
-              <a:rPr lang="fr-CA" dirty="0" err="1" smtClean="0"/>
+              <a:rPr lang="fr-CA" sz="2800" dirty="0" err="1" smtClean="0"/>
               <a:t>âches</a:t>
             </a:r>
-            <a:endParaRPr lang="en-US" dirty="0"/>
+            <a:endParaRPr lang="en-US" sz="2800" dirty="0"/>
           </a:p>
         </p:txBody>
       </p:sp>
@@ -8827,8 +8912,8 @@
         </p:nvSpPr>
         <p:spPr>
           <a:xfrm>
-            <a:off x="3316360" y="850367"/>
-            <a:ext cx="2736647" cy="923330"/>
+            <a:off x="2379515" y="710231"/>
+            <a:ext cx="4152099" cy="1077218"/>
           </a:xfrm>
           <a:prstGeom prst="rect">
             <a:avLst/>
@@ -8842,9 +8927,10 @@
           <a:lstStyle/>
           <a:p>
             <a:r>
-              <a:rPr lang="fr-CA" dirty="0"/>
-              <a:t>Les styles de jeu utilisés </a:t>
-            </a:r>
+              <a:rPr lang="fr-CA" sz="2800" dirty="0" smtClean="0"/>
+              <a:t>STYLE DE JEU UTILISÉ</a:t>
+            </a:r>
+            <a:endParaRPr lang="fr-CA" sz="2800" dirty="0"/>
           </a:p>
           <a:p>
             <a:endParaRPr lang="fr-CA" b="1" dirty="0"/>
@@ -9048,10 +9134,13 @@
           <a:lstStyle/>
           <a:p>
             <a:r>
-              <a:rPr lang="fr-FR" smtClean="0"/>
+              <a:rPr lang="fr-FR" dirty="0" smtClean="0">
+                <a:solidFill>
+                  <a:schemeClr val="bg1"/>
+                </a:solidFill>
+              </a:rPr>
               <a:t>Journey</a:t>
             </a:r>
-            <a:endParaRPr lang="fr-FR" dirty="0" smtClean="0"/>
           </a:p>
         </p:txBody>
       </p:sp>
@@ -9064,7 +9153,7 @@
         <p:spPr>
           <a:xfrm>
             <a:off x="2133226" y="642400"/>
-            <a:ext cx="4940300" cy="369332"/>
+            <a:ext cx="4940300" cy="523220"/>
           </a:xfrm>
           <a:prstGeom prst="rect">
             <a:avLst/>
@@ -9079,10 +9168,18 @@
           <a:p>
             <a:pPr algn="ctr"/>
             <a:r>
-              <a:rPr lang="en-US" dirty="0" smtClean="0"/>
+              <a:rPr lang="en-US" sz="2800" b="1" dirty="0">
+                <a:solidFill>
+                  <a:schemeClr val="bg1"/>
+                </a:solidFill>
+              </a:rPr>
               <a:t>Inspiration</a:t>
             </a:r>
-            <a:endParaRPr lang="en-US" dirty="0"/>
+            <a:endParaRPr lang="en-US" sz="2800" b="1" dirty="0">
+              <a:solidFill>
+                <a:schemeClr val="bg1"/>
+              </a:solidFill>
+            </a:endParaRPr>
           </a:p>
         </p:txBody>
       </p:sp>
@@ -9310,7 +9407,11 @@
           <a:lstStyle/>
           <a:p>
             <a:r>
-              <a:rPr lang="fr-FR" dirty="0" smtClean="0"/>
+              <a:rPr lang="fr-FR" dirty="0" smtClean="0">
+                <a:solidFill>
+                  <a:schemeClr val="bg1"/>
+                </a:solidFill>
+              </a:rPr>
               <a:t>Mario 3d</a:t>
             </a:r>
           </a:p>
@@ -9325,7 +9426,7 @@
         <p:spPr>
           <a:xfrm>
             <a:off x="2133226" y="642400"/>
-            <a:ext cx="4940300" cy="369332"/>
+            <a:ext cx="4940300" cy="523220"/>
           </a:xfrm>
           <a:prstGeom prst="rect">
             <a:avLst/>
@@ -9340,10 +9441,18 @@
           <a:p>
             <a:pPr algn="ctr"/>
             <a:r>
-              <a:rPr lang="en-US" dirty="0" smtClean="0"/>
+              <a:rPr lang="en-US" sz="2800" b="1" dirty="0" smtClean="0">
+                <a:solidFill>
+                  <a:schemeClr val="bg1"/>
+                </a:solidFill>
+              </a:rPr>
               <a:t>Inspiration</a:t>
             </a:r>
-            <a:endParaRPr lang="en-US" dirty="0"/>
+            <a:endParaRPr lang="en-US" sz="2800" b="1" dirty="0">
+              <a:solidFill>
+                <a:schemeClr val="bg1"/>
+              </a:solidFill>
+            </a:endParaRPr>
           </a:p>
         </p:txBody>
       </p:sp>
@@ -9526,8 +9635,8 @@
         </p:nvSpPr>
         <p:spPr>
           <a:xfrm>
-            <a:off x="965200" y="642400"/>
-            <a:ext cx="6108326" cy="369332"/>
+            <a:off x="0" y="515400"/>
+            <a:ext cx="9316571" cy="523220"/>
           </a:xfrm>
           <a:prstGeom prst="rect">
             <a:avLst/>
@@ -9541,14 +9650,10 @@
           <a:lstStyle/>
           <a:p>
             <a:r>
-              <a:rPr lang="fr-CA" dirty="0"/>
-              <a:t>Le langage de programmation et les technologies </a:t>
-            </a:r>
-            <a:r>
-              <a:rPr lang="fr-CA" dirty="0" smtClean="0"/>
-              <a:t>utilisées</a:t>
-            </a:r>
-            <a:endParaRPr lang="fr-CA" dirty="0"/>
+              <a:rPr lang="fr-CA" sz="2800" dirty="0" smtClean="0"/>
+              <a:t>LANGAGE DE PROGRAMMATION ET TECHNOLOGIES</a:t>
+            </a:r>
+            <a:endParaRPr lang="fr-CA" sz="2800" dirty="0"/>
           </a:p>
         </p:txBody>
       </p:sp>
@@ -9725,8 +9830,12 @@
               <a:t>Modèle </a:t>
             </a:r>
             <a:r>
-              <a:rPr lang="fr-FR" b="1" smtClean="0"/>
-              <a:t>Avec texture</a:t>
+              <a:rPr lang="fr-FR" b="1" dirty="0" smtClean="0"/>
+              <a:t>avec </a:t>
+            </a:r>
+            <a:r>
+              <a:rPr lang="fr-FR" b="1" dirty="0" smtClean="0"/>
+              <a:t>texture</a:t>
             </a:r>
             <a:endParaRPr lang="fr-FR" sz="1600" dirty="0"/>
           </a:p>
@@ -9803,12 +9912,8 @@
               <a:t> </a:t>
             </a:r>
             <a:r>
-              <a:rPr lang="fr-FR" b="1" dirty="0" err="1"/>
-              <a:t>D</a:t>
-            </a:r>
-            <a:r>
-              <a:rPr lang="fr-FR" b="1" dirty="0" err="1" smtClean="0"/>
-              <a:t>ye</a:t>
+              <a:rPr lang="fr-FR" b="1" dirty="0" smtClean="0"/>
+              <a:t>Die</a:t>
             </a:r>
             <a:endParaRPr lang="fr-FR" sz="1600" dirty="0"/>
           </a:p>
@@ -9981,8 +10086,13 @@
           <a:p>
             <a:r>
               <a:rPr lang="fr-FR" b="1" dirty="0" smtClean="0"/>
-              <a:t>Le modèle est une pilules</a:t>
-            </a:r>
+              <a:t>Le modèle est une </a:t>
+            </a:r>
+            <a:r>
+              <a:rPr lang="fr-FR" b="1" dirty="0" smtClean="0"/>
+              <a:t>pilule</a:t>
+            </a:r>
+            <a:endParaRPr lang="fr-FR" b="1" dirty="0" smtClean="0"/>
           </a:p>
           <a:p>
             <a:r>
@@ -10016,15 +10126,15 @@
             </a:r>
             <a:r>
               <a:rPr lang="fr-FR" sz="1600" b="1" dirty="0" smtClean="0"/>
-              <a:t>onter et descendre, a	</a:t>
-            </a:r>
-            <a:r>
-              <a:rPr lang="fr-FR" sz="1600" b="1" dirty="0" err="1" smtClean="0"/>
-              <a:t>insi</a:t>
+              <a:t>onter et descendre, </a:t>
             </a:r>
             <a:r>
               <a:rPr lang="fr-FR" sz="1600" b="1" dirty="0" smtClean="0"/>
-              <a:t> que </a:t>
+              <a:t>ainsi </a:t>
+            </a:r>
+            <a:r>
+              <a:rPr lang="fr-FR" sz="1600" b="1" dirty="0" smtClean="0"/>
+              <a:t>que </a:t>
             </a:r>
           </a:p>
           <a:p>

</xml_diff>